<commit_message>
add alert function without log in
</commit_message>
<xml_diff>
--- a/Εφαρμογή Διαχείρησης Αλυσίδας Πρατηρίων.pptx
+++ b/Εφαρμογή Διαχείρησης Αλυσίδας Πρατηρίων.pptx
@@ -10,6 +10,8 @@
     <p:sldId id="258" r:id="rId4"/>
     <p:sldId id="257" r:id="rId5"/>
     <p:sldId id="260" r:id="rId6"/>
+    <p:sldId id="261" r:id="rId7"/>
+    <p:sldId id="262" r:id="rId8"/>
   </p:sldIdLst>
   <p:sldSz cx="12192000" cy="6858000"/>
   <p:notesSz cx="6858000" cy="9144000"/>
@@ -8285,6 +8287,226 @@
 </p:sld>
 </file>
 
+<file path=ppt/slides/slide6.xml><?xml version="1.0" encoding="utf-8"?>
+<p:sld xmlns:a="http://schemas.openxmlformats.org/drawingml/2006/main" xmlns:r="http://schemas.openxmlformats.org/officeDocument/2006/relationships" xmlns:p="http://schemas.openxmlformats.org/presentationml/2006/main">
+  <p:cSld>
+    <p:spTree>
+      <p:nvGrpSpPr>
+        <p:cNvPr id="1" name=""/>
+        <p:cNvGrpSpPr/>
+        <p:nvPr/>
+      </p:nvGrpSpPr>
+      <p:grpSpPr>
+        <a:xfrm>
+          <a:off x="0" y="0"/>
+          <a:ext cx="0" cy="0"/>
+          <a:chOff x="0" y="0"/>
+          <a:chExt cx="0" cy="0"/>
+        </a:xfrm>
+      </p:grpSpPr>
+      <p:sp>
+        <p:nvSpPr>
+          <p:cNvPr id="2" name="Τίτλος 1">
+            <a:extLst>
+              <a:ext uri="{FF2B5EF4-FFF2-40B4-BE49-F238E27FC236}">
+                <a16:creationId xmlns:a16="http://schemas.microsoft.com/office/drawing/2014/main" id="{02451B76-D988-42E4-8017-24485D12335F}"/>
+              </a:ext>
+            </a:extLst>
+          </p:cNvPr>
+          <p:cNvSpPr>
+            <a:spLocks noGrp="1"/>
+          </p:cNvSpPr>
+          <p:nvPr>
+            <p:ph type="title"/>
+          </p:nvPr>
+        </p:nvSpPr>
+        <p:spPr/>
+        <p:txBody>
+          <a:bodyPr/>
+          <a:lstStyle/>
+          <a:p>
+            <a:endParaRPr lang="en-US"/>
+          </a:p>
+        </p:txBody>
+      </p:sp>
+      <p:sp>
+        <p:nvSpPr>
+          <p:cNvPr id="3" name="Θέση περιεχομένου 2">
+            <a:extLst>
+              <a:ext uri="{FF2B5EF4-FFF2-40B4-BE49-F238E27FC236}">
+                <a16:creationId xmlns:a16="http://schemas.microsoft.com/office/drawing/2014/main" id="{60CC9287-36C4-4105-9149-D1015E5ECC1D}"/>
+              </a:ext>
+            </a:extLst>
+          </p:cNvPr>
+          <p:cNvSpPr>
+            <a:spLocks noGrp="1"/>
+          </p:cNvSpPr>
+          <p:nvPr>
+            <p:ph idx="1"/>
+          </p:nvPr>
+        </p:nvSpPr>
+        <p:spPr/>
+        <p:txBody>
+          <a:bodyPr/>
+          <a:lstStyle/>
+          <a:p>
+            <a:endParaRPr lang="en-US"/>
+          </a:p>
+        </p:txBody>
+      </p:sp>
+      <p:pic>
+        <p:nvPicPr>
+          <p:cNvPr id="5" name="Εικόνα 4">
+            <a:extLst>
+              <a:ext uri="{FF2B5EF4-FFF2-40B4-BE49-F238E27FC236}">
+                <a16:creationId xmlns:a16="http://schemas.microsoft.com/office/drawing/2014/main" id="{74890FD1-0DCB-4187-8425-F2634C78F019}"/>
+              </a:ext>
+            </a:extLst>
+          </p:cNvPr>
+          <p:cNvPicPr>
+            <a:picLocks noChangeAspect="1"/>
+          </p:cNvPicPr>
+          <p:nvPr/>
+        </p:nvPicPr>
+        <p:blipFill>
+          <a:blip r:embed="rId2"/>
+          <a:stretch>
+            <a:fillRect/>
+          </a:stretch>
+        </p:blipFill>
+        <p:spPr>
+          <a:xfrm>
+            <a:off x="0" y="-73163"/>
+            <a:ext cx="12459626" cy="4940998"/>
+          </a:xfrm>
+          <a:prstGeom prst="rect">
+            <a:avLst/>
+          </a:prstGeom>
+        </p:spPr>
+      </p:pic>
+    </p:spTree>
+    <p:extLst>
+      <p:ext uri="{BB962C8B-B14F-4D97-AF65-F5344CB8AC3E}">
+        <p14:creationId xmlns:p14="http://schemas.microsoft.com/office/powerpoint/2010/main" val="864070692"/>
+      </p:ext>
+    </p:extLst>
+  </p:cSld>
+  <p:clrMapOvr>
+    <a:masterClrMapping/>
+  </p:clrMapOvr>
+</p:sld>
+</file>
+
+<file path=ppt/slides/slide7.xml><?xml version="1.0" encoding="utf-8"?>
+<p:sld xmlns:a="http://schemas.openxmlformats.org/drawingml/2006/main" xmlns:r="http://schemas.openxmlformats.org/officeDocument/2006/relationships" xmlns:p="http://schemas.openxmlformats.org/presentationml/2006/main">
+  <p:cSld>
+    <p:spTree>
+      <p:nvGrpSpPr>
+        <p:cNvPr id="1" name=""/>
+        <p:cNvGrpSpPr/>
+        <p:nvPr/>
+      </p:nvGrpSpPr>
+      <p:grpSpPr>
+        <a:xfrm>
+          <a:off x="0" y="0"/>
+          <a:ext cx="0" cy="0"/>
+          <a:chOff x="0" y="0"/>
+          <a:chExt cx="0" cy="0"/>
+        </a:xfrm>
+      </p:grpSpPr>
+      <p:sp>
+        <p:nvSpPr>
+          <p:cNvPr id="2" name="Τίτλος 1">
+            <a:extLst>
+              <a:ext uri="{FF2B5EF4-FFF2-40B4-BE49-F238E27FC236}">
+                <a16:creationId xmlns:a16="http://schemas.microsoft.com/office/drawing/2014/main" id="{46982132-7AF1-4E50-B538-D0AF4E6B78D3}"/>
+              </a:ext>
+            </a:extLst>
+          </p:cNvPr>
+          <p:cNvSpPr>
+            <a:spLocks noGrp="1"/>
+          </p:cNvSpPr>
+          <p:nvPr>
+            <p:ph type="title"/>
+          </p:nvPr>
+        </p:nvSpPr>
+        <p:spPr/>
+        <p:txBody>
+          <a:bodyPr/>
+          <a:lstStyle/>
+          <a:p>
+            <a:endParaRPr lang="en-US"/>
+          </a:p>
+        </p:txBody>
+      </p:sp>
+      <p:sp>
+        <p:nvSpPr>
+          <p:cNvPr id="3" name="Θέση περιεχομένου 2">
+            <a:extLst>
+              <a:ext uri="{FF2B5EF4-FFF2-40B4-BE49-F238E27FC236}">
+                <a16:creationId xmlns:a16="http://schemas.microsoft.com/office/drawing/2014/main" id="{E1175FED-3DCC-485B-91E9-EC51833C68F5}"/>
+              </a:ext>
+            </a:extLst>
+          </p:cNvPr>
+          <p:cNvSpPr>
+            <a:spLocks noGrp="1"/>
+          </p:cNvSpPr>
+          <p:nvPr>
+            <p:ph idx="1"/>
+          </p:nvPr>
+        </p:nvSpPr>
+        <p:spPr/>
+        <p:txBody>
+          <a:bodyPr/>
+          <a:lstStyle/>
+          <a:p>
+            <a:endParaRPr lang="en-US"/>
+          </a:p>
+        </p:txBody>
+      </p:sp>
+      <p:pic>
+        <p:nvPicPr>
+          <p:cNvPr id="5" name="Εικόνα 4">
+            <a:extLst>
+              <a:ext uri="{FF2B5EF4-FFF2-40B4-BE49-F238E27FC236}">
+                <a16:creationId xmlns:a16="http://schemas.microsoft.com/office/drawing/2014/main" id="{1006C873-571A-4902-8BEC-83A0433B3F39}"/>
+              </a:ext>
+            </a:extLst>
+          </p:cNvPr>
+          <p:cNvPicPr>
+            <a:picLocks noChangeAspect="1"/>
+          </p:cNvPicPr>
+          <p:nvPr/>
+        </p:nvPicPr>
+        <p:blipFill>
+          <a:blip r:embed="rId2"/>
+          <a:stretch>
+            <a:fillRect/>
+          </a:stretch>
+        </p:blipFill>
+        <p:spPr>
+          <a:xfrm>
+            <a:off x="2589379" y="0"/>
+            <a:ext cx="7013241" cy="6858000"/>
+          </a:xfrm>
+          <a:prstGeom prst="rect">
+            <a:avLst/>
+          </a:prstGeom>
+        </p:spPr>
+      </p:pic>
+    </p:spTree>
+    <p:extLst>
+      <p:ext uri="{BB962C8B-B14F-4D97-AF65-F5344CB8AC3E}">
+        <p14:creationId xmlns:p14="http://schemas.microsoft.com/office/powerpoint/2010/main" val="4293313868"/>
+      </p:ext>
+    </p:extLst>
+  </p:cSld>
+  <p:clrMapOvr>
+    <a:masterClrMapping/>
+  </p:clrMapOvr>
+</p:sld>
+</file>
+
 <file path=ppt/theme/theme1.xml><?xml version="1.0" encoding="utf-8"?>
 <a:theme xmlns:a="http://schemas.openxmlformats.org/drawingml/2006/main" name="Θρόισμα">
   <a:themeElements>

</xml_diff>